<commit_message>
Added a couple of graphics
</commit_message>
<xml_diff>
--- a/360/360.pptx
+++ b/360/360.pptx
@@ -8303,6 +8303,36 @@
           <a:chExt cx="0" cy="0"/>
         </a:xfrm>
       </p:grpSpPr>
+      <p:pic>
+        <p:nvPicPr>
+          <p:cNvPr id="5" name="Picture 4" descr="Screenshot_16.png"/>
+          <p:cNvPicPr>
+            <a:picLocks noChangeAspect="1"/>
+          </p:cNvPicPr>
+          <p:nvPr/>
+        </p:nvPicPr>
+        <p:blipFill>
+          <a:blip r:embed="rId3">
+            <a:extLst>
+              <a:ext uri="{28A0092B-C50C-407E-A947-70E740481C1C}">
+                <a14:useLocalDpi xmlns:a14="http://schemas.microsoft.com/office/drawing/2010/main" val="0"/>
+              </a:ext>
+            </a:extLst>
+          </a:blip>
+          <a:stretch>
+            <a:fillRect/>
+          </a:stretch>
+        </p:blipFill>
+        <p:spPr>
+          <a:xfrm>
+            <a:off x="6980028" y="1346200"/>
+            <a:ext cx="1955800" cy="4450080"/>
+          </a:xfrm>
+          <a:prstGeom prst="rect">
+            <a:avLst/>
+          </a:prstGeom>
+        </p:spPr>
+      </p:pic>
       <p:sp>
         <p:nvSpPr>
           <p:cNvPr id="2" name="Title 1"/>
@@ -8412,8 +8442,8 @@
         </p:nvSpPr>
         <p:spPr>
           <a:xfrm>
-            <a:off x="728133" y="3118447"/>
-            <a:ext cx="7958667" cy="1323439"/>
+            <a:off x="457201" y="3703697"/>
+            <a:ext cx="6353718" cy="1323439"/>
           </a:xfrm>
           <a:prstGeom prst="rect">
             <a:avLst/>
@@ -8490,7 +8520,21 @@
                 <a:latin typeface="Courier"/>
                 <a:cs typeface="Courier"/>
               </a:rPr>
-              <a:t>	alert('Shaken, not stirred');</a:t>
+              <a:t>	alert</a:t>
+            </a:r>
+            <a:r>
+              <a:rPr lang="en-US" sz="1600" dirty="0" smtClean="0">
+                <a:latin typeface="Courier"/>
+                <a:cs typeface="Courier"/>
+              </a:rPr>
+              <a:t>(’it worked!'</a:t>
+            </a:r>
+            <a:r>
+              <a:rPr lang="en-US" sz="1600" dirty="0">
+                <a:latin typeface="Courier"/>
+                <a:cs typeface="Courier"/>
+              </a:rPr>
+              <a:t>);</a:t>
             </a:r>
           </a:p>
           <a:p>
@@ -8695,6 +8739,365 @@
           </a:p>
         </p:txBody>
       </p:sp>
+      <p:pic>
+        <p:nvPicPr>
+          <p:cNvPr id="12" name="Picture 11" descr="Screenshot_17.png"/>
+          <p:cNvPicPr>
+            <a:picLocks noChangeAspect="1"/>
+          </p:cNvPicPr>
+          <p:nvPr/>
+        </p:nvPicPr>
+        <p:blipFill>
+          <a:blip r:embed="rId3">
+            <a:extLst>
+              <a:ext uri="{28A0092B-C50C-407E-A947-70E740481C1C}">
+                <a14:useLocalDpi xmlns:a14="http://schemas.microsoft.com/office/drawing/2010/main" val="0"/>
+              </a:ext>
+            </a:extLst>
+          </a:blip>
+          <a:stretch>
+            <a:fillRect/>
+          </a:stretch>
+        </p:blipFill>
+        <p:spPr>
+          <a:xfrm>
+            <a:off x="6312444" y="1945072"/>
+            <a:ext cx="1955800" cy="4450080"/>
+          </a:xfrm>
+          <a:prstGeom prst="rect">
+            <a:avLst/>
+          </a:prstGeom>
+        </p:spPr>
+      </p:pic>
+      <p:grpSp>
+        <p:nvGrpSpPr>
+          <p:cNvPr id="14" name="Group 13"/>
+          <p:cNvGrpSpPr/>
+          <p:nvPr/>
+        </p:nvGrpSpPr>
+        <p:grpSpPr>
+          <a:xfrm>
+            <a:off x="7064606" y="3104653"/>
+            <a:ext cx="976563" cy="543788"/>
+            <a:chOff x="4238137" y="4524194"/>
+            <a:chExt cx="1128963" cy="628650"/>
+          </a:xfrm>
+        </p:grpSpPr>
+        <p:grpSp>
+          <p:nvGrpSpPr>
+            <p:cNvPr id="5" name="Group 61"/>
+            <p:cNvGrpSpPr>
+              <a:grpSpLocks/>
+            </p:cNvGrpSpPr>
+            <p:nvPr/>
+          </p:nvGrpSpPr>
+          <p:grpSpPr bwMode="auto">
+            <a:xfrm flipH="1">
+              <a:off x="4427299" y="4530544"/>
+              <a:ext cx="939801" cy="622300"/>
+              <a:chOff x="0" y="0"/>
+              <a:chExt cx="592" cy="392"/>
+            </a:xfrm>
+          </p:grpSpPr>
+          <p:pic>
+            <p:nvPicPr>
+              <p:cNvPr id="9" name="Picture 62"/>
+              <p:cNvPicPr>
+                <a:picLocks noChangeArrowheads="1"/>
+              </p:cNvPicPr>
+              <p:nvPr/>
+            </p:nvPicPr>
+            <p:blipFill>
+              <a:blip r:embed="rId4">
+                <a:extLst>
+                  <a:ext uri="{28A0092B-C50C-407E-A947-70E740481C1C}">
+                    <a14:useLocalDpi xmlns:a14="http://schemas.microsoft.com/office/drawing/2010/main" val="0"/>
+                  </a:ext>
+                </a:extLst>
+              </a:blip>
+              <a:srcRect/>
+              <a:stretch>
+                <a:fillRect/>
+              </a:stretch>
+            </p:blipFill>
+            <p:spPr bwMode="auto">
+              <a:xfrm>
+                <a:off x="0" y="0"/>
+                <a:ext cx="392" cy="392"/>
+              </a:xfrm>
+              <a:prstGeom prst="rect">
+                <a:avLst/>
+              </a:prstGeom>
+              <a:noFill/>
+              <a:ln>
+                <a:noFill/>
+              </a:ln>
+              <a:extLst>
+                <a:ext uri="{909E8E84-426E-40dd-AFC4-6F175D3DCCD1}">
+                  <a14:hiddenFill xmlns:a14="http://schemas.microsoft.com/office/drawing/2010/main">
+                    <a:solidFill>
+                      <a:srgbClr val="FFFFFF"/>
+                    </a:solidFill>
+                  </a14:hiddenFill>
+                </a:ext>
+                <a:ext uri="{91240B29-F687-4f45-9708-019B960494DF}">
+                  <a14:hiddenLine xmlns:a14="http://schemas.microsoft.com/office/drawing/2010/main" w="12700">
+                    <a:solidFill>
+                      <a:srgbClr val="000000"/>
+                    </a:solidFill>
+                    <a:miter lim="800000"/>
+                    <a:headEnd/>
+                    <a:tailEnd/>
+                  </a14:hiddenLine>
+                </a:ext>
+              </a:extLst>
+            </p:spPr>
+          </p:pic>
+          <p:pic>
+            <p:nvPicPr>
+              <p:cNvPr id="10" name="Picture 63"/>
+              <p:cNvPicPr>
+                <a:picLocks noChangeArrowheads="1"/>
+              </p:cNvPicPr>
+              <p:nvPr/>
+            </p:nvPicPr>
+            <p:blipFill>
+              <a:blip r:embed="rId5">
+                <a:extLst>
+                  <a:ext uri="{28A0092B-C50C-407E-A947-70E740481C1C}">
+                    <a14:useLocalDpi xmlns:a14="http://schemas.microsoft.com/office/drawing/2010/main" val="0"/>
+                  </a:ext>
+                </a:extLst>
+              </a:blip>
+              <a:srcRect/>
+              <a:stretch>
+                <a:fillRect/>
+              </a:stretch>
+            </p:blipFill>
+            <p:spPr bwMode="auto">
+              <a:xfrm>
+                <a:off x="96" y="0"/>
+                <a:ext cx="392" cy="392"/>
+              </a:xfrm>
+              <a:prstGeom prst="rect">
+                <a:avLst/>
+              </a:prstGeom>
+              <a:noFill/>
+              <a:ln>
+                <a:noFill/>
+              </a:ln>
+              <a:extLst>
+                <a:ext uri="{909E8E84-426E-40dd-AFC4-6F175D3DCCD1}">
+                  <a14:hiddenFill xmlns:a14="http://schemas.microsoft.com/office/drawing/2010/main">
+                    <a:solidFill>
+                      <a:srgbClr val="FFFFFF"/>
+                    </a:solidFill>
+                  </a14:hiddenFill>
+                </a:ext>
+                <a:ext uri="{91240B29-F687-4f45-9708-019B960494DF}">
+                  <a14:hiddenLine xmlns:a14="http://schemas.microsoft.com/office/drawing/2010/main" w="12700">
+                    <a:solidFill>
+                      <a:srgbClr val="000000"/>
+                    </a:solidFill>
+                    <a:miter lim="800000"/>
+                    <a:headEnd/>
+                    <a:tailEnd/>
+                  </a14:hiddenLine>
+                </a:ext>
+              </a:extLst>
+            </p:spPr>
+          </p:pic>
+          <p:pic>
+            <p:nvPicPr>
+              <p:cNvPr id="11" name="Picture 64"/>
+              <p:cNvPicPr>
+                <a:picLocks noChangeArrowheads="1"/>
+              </p:cNvPicPr>
+              <p:nvPr/>
+            </p:nvPicPr>
+            <p:blipFill>
+              <a:blip r:embed="rId6">
+                <a:extLst>
+                  <a:ext uri="{28A0092B-C50C-407E-A947-70E740481C1C}">
+                    <a14:useLocalDpi xmlns:a14="http://schemas.microsoft.com/office/drawing/2010/main" val="0"/>
+                  </a:ext>
+                </a:extLst>
+              </a:blip>
+              <a:srcRect/>
+              <a:stretch>
+                <a:fillRect/>
+              </a:stretch>
+            </p:blipFill>
+            <p:spPr bwMode="auto">
+              <a:xfrm>
+                <a:off x="200" y="0"/>
+                <a:ext cx="392" cy="392"/>
+              </a:xfrm>
+              <a:prstGeom prst="rect">
+                <a:avLst/>
+              </a:prstGeom>
+              <a:noFill/>
+              <a:ln>
+                <a:noFill/>
+              </a:ln>
+              <a:extLst>
+                <a:ext uri="{909E8E84-426E-40dd-AFC4-6F175D3DCCD1}">
+                  <a14:hiddenFill xmlns:a14="http://schemas.microsoft.com/office/drawing/2010/main">
+                    <a:solidFill>
+                      <a:srgbClr val="FFFFFF"/>
+                    </a:solidFill>
+                  </a14:hiddenFill>
+                </a:ext>
+                <a:ext uri="{91240B29-F687-4f45-9708-019B960494DF}">
+                  <a14:hiddenLine xmlns:a14="http://schemas.microsoft.com/office/drawing/2010/main" w="12700">
+                    <a:solidFill>
+                      <a:srgbClr val="000000"/>
+                    </a:solidFill>
+                    <a:miter lim="800000"/>
+                    <a:headEnd/>
+                    <a:tailEnd/>
+                  </a14:hiddenLine>
+                </a:ext>
+              </a:extLst>
+            </p:spPr>
+          </p:pic>
+        </p:grpSp>
+        <p:grpSp>
+          <p:nvGrpSpPr>
+            <p:cNvPr id="6" name="Group 65"/>
+            <p:cNvGrpSpPr>
+              <a:grpSpLocks/>
+            </p:cNvGrpSpPr>
+            <p:nvPr/>
+          </p:nvGrpSpPr>
+          <p:grpSpPr bwMode="auto">
+            <a:xfrm>
+              <a:off x="4238137" y="4524194"/>
+              <a:ext cx="687388" cy="622300"/>
+              <a:chOff x="0" y="0"/>
+              <a:chExt cx="433" cy="392"/>
+            </a:xfrm>
+          </p:grpSpPr>
+          <p:pic>
+            <p:nvPicPr>
+              <p:cNvPr id="7" name="Picture 66"/>
+              <p:cNvPicPr>
+                <a:picLocks noChangeArrowheads="1"/>
+              </p:cNvPicPr>
+              <p:nvPr/>
+            </p:nvPicPr>
+            <p:blipFill>
+              <a:blip r:embed="rId7">
+                <a:extLst>
+                  <a:ext uri="{28A0092B-C50C-407E-A947-70E740481C1C}">
+                    <a14:useLocalDpi xmlns:a14="http://schemas.microsoft.com/office/drawing/2010/main" val="0"/>
+                  </a:ext>
+                </a:extLst>
+              </a:blip>
+              <a:srcRect/>
+              <a:stretch>
+                <a:fillRect/>
+              </a:stretch>
+            </p:blipFill>
+            <p:spPr bwMode="auto">
+              <a:xfrm>
+                <a:off x="20" y="0"/>
+                <a:ext cx="392" cy="392"/>
+              </a:xfrm>
+              <a:prstGeom prst="rect">
+                <a:avLst/>
+              </a:prstGeom>
+              <a:noFill/>
+              <a:ln>
+                <a:noFill/>
+              </a:ln>
+              <a:extLst>
+                <a:ext uri="{909E8E84-426E-40dd-AFC4-6F175D3DCCD1}">
+                  <a14:hiddenFill xmlns:a14="http://schemas.microsoft.com/office/drawing/2010/main">
+                    <a:solidFill>
+                      <a:srgbClr val="FFFFFF"/>
+                    </a:solidFill>
+                  </a14:hiddenFill>
+                </a:ext>
+                <a:ext uri="{91240B29-F687-4f45-9708-019B960494DF}">
+                  <a14:hiddenLine xmlns:a14="http://schemas.microsoft.com/office/drawing/2010/main" w="12700">
+                    <a:solidFill>
+                      <a:srgbClr val="000000"/>
+                    </a:solidFill>
+                    <a:miter lim="800000"/>
+                    <a:headEnd/>
+                    <a:tailEnd/>
+                  </a14:hiddenLine>
+                </a:ext>
+              </a:extLst>
+            </p:spPr>
+          </p:pic>
+          <p:sp>
+            <p:nvSpPr>
+              <p:cNvPr id="8" name="Rectangle 67"/>
+              <p:cNvSpPr>
+                <a:spLocks/>
+              </p:cNvSpPr>
+              <p:nvPr/>
+            </p:nvSpPr>
+            <p:spPr bwMode="auto">
+              <a:xfrm>
+                <a:off x="0" y="118"/>
+                <a:ext cx="433" cy="155"/>
+              </a:xfrm>
+              <a:prstGeom prst="rect">
+                <a:avLst/>
+              </a:prstGeom>
+              <a:noFill/>
+              <a:ln w="12700" cap="flat">
+                <a:noFill/>
+                <a:miter lim="800000"/>
+                <a:headEnd type="none" w="med" len="med"/>
+                <a:tailEnd type="none" w="med" len="med"/>
+              </a:ln>
+              <a:effectLst>
+                <a:outerShdw dist="12699" dir="16200000" algn="ctr" rotWithShape="0">
+                  <a:schemeClr val="bg2">
+                    <a:alpha val="50000"/>
+                  </a:schemeClr>
+                </a:outerShdw>
+              </a:effectLst>
+            </p:spPr>
+            <p:txBody>
+              <a:bodyPr wrap="none" lIns="0" tIns="0" rIns="0" bIns="0" anchor="ctr">
+                <a:spAutoFit/>
+              </a:bodyPr>
+              <a:lstStyle/>
+              <a:p>
+                <a:pPr>
+                  <a:defRPr/>
+                </a:pPr>
+                <a:r>
+                  <a:rPr lang="en-US" sz="1600" b="1" dirty="0" smtClean="0">
+                    <a:solidFill>
+                      <a:srgbClr val="FFFFFF"/>
+                    </a:solidFill>
+                    <a:latin typeface="Helvetica Neue" charset="0"/>
+                    <a:ea typeface="Helvetica Neue" charset="0"/>
+                    <a:cs typeface="Helvetica Neue" charset="0"/>
+                    <a:sym typeface="Helvetica Neue" charset="0"/>
+                  </a:rPr>
+                  <a:t>  swipe</a:t>
+                </a:r>
+                <a:endParaRPr lang="en-US" sz="1600" b="1" dirty="0">
+                  <a:solidFill>
+                    <a:srgbClr val="FFFFFF"/>
+                  </a:solidFill>
+                  <a:latin typeface="Helvetica Neue" charset="0"/>
+                  <a:ea typeface="Helvetica Neue" charset="0"/>
+                  <a:cs typeface="Helvetica Neue" charset="0"/>
+                  <a:sym typeface="Helvetica Neue" charset="0"/>
+                </a:endParaRPr>
+              </a:p>
+            </p:txBody>
+          </p:sp>
+        </p:grpSp>
+      </p:grpSp>
     </p:spTree>
     <p:extLst>
       <p:ext uri="{BB962C8B-B14F-4D97-AF65-F5344CB8AC3E}">
@@ -9819,6 +10222,66 @@
           </a:p>
         </p:txBody>
       </p:sp>
+      <p:pic>
+        <p:nvPicPr>
+          <p:cNvPr id="4" name="Picture 3" descr="Screenshot_15.png"/>
+          <p:cNvPicPr>
+            <a:picLocks noChangeAspect="1"/>
+          </p:cNvPicPr>
+          <p:nvPr/>
+        </p:nvPicPr>
+        <p:blipFill>
+          <a:blip r:embed="rId3">
+            <a:extLst>
+              <a:ext uri="{28A0092B-C50C-407E-A947-70E740481C1C}">
+                <a14:useLocalDpi xmlns:a14="http://schemas.microsoft.com/office/drawing/2010/main" val="0"/>
+              </a:ext>
+            </a:extLst>
+          </a:blip>
+          <a:stretch>
+            <a:fillRect/>
+          </a:stretch>
+        </p:blipFill>
+        <p:spPr>
+          <a:xfrm>
+            <a:off x="6515919" y="1842912"/>
+            <a:ext cx="1955800" cy="4450080"/>
+          </a:xfrm>
+          <a:prstGeom prst="rect">
+            <a:avLst/>
+          </a:prstGeom>
+        </p:spPr>
+      </p:pic>
+      <p:pic>
+        <p:nvPicPr>
+          <p:cNvPr id="5" name="Picture 4" descr="Screenshot_14.png"/>
+          <p:cNvPicPr>
+            <a:picLocks noChangeAspect="1"/>
+          </p:cNvPicPr>
+          <p:nvPr/>
+        </p:nvPicPr>
+        <p:blipFill>
+          <a:blip r:embed="rId4">
+            <a:extLst>
+              <a:ext uri="{28A0092B-C50C-407E-A947-70E740481C1C}">
+                <a14:useLocalDpi xmlns:a14="http://schemas.microsoft.com/office/drawing/2010/main" val="0"/>
+              </a:ext>
+            </a:extLst>
+          </a:blip>
+          <a:stretch>
+            <a:fillRect/>
+          </a:stretch>
+        </p:blipFill>
+        <p:spPr>
+          <a:xfrm>
+            <a:off x="3287171" y="4137957"/>
+            <a:ext cx="3804920" cy="2468880"/>
+          </a:xfrm>
+          <a:prstGeom prst="rect">
+            <a:avLst/>
+          </a:prstGeom>
+        </p:spPr>
+      </p:pic>
     </p:spTree>
     <p:extLst>
       <p:ext uri="{BB962C8B-B14F-4D97-AF65-F5344CB8AC3E}">

</xml_diff>